<commit_message>
branch lesson ppt updated, minor tweaks to .md & all file names shortened for better display on Git
</commit_message>
<xml_diff>
--- a/GitHub_win7/Git Branching Example - Lesson3.pptx
+++ b/GitHub_win7/Git Branching Example - Lesson3.pptx
@@ -249,7 +249,7 @@
           <a:p>
             <a:fld id="{696B610F-1BCF-4E6C-A467-DBFDBF323FD6}" type="datetimeFigureOut">
               <a:rPr lang="en-US" smtClean="0"/>
-              <a:t>11/25/2016</a:t>
+              <a:t>11/26/2016</a:t>
             </a:fld>
             <a:endParaRPr lang="en-US"/>
           </a:p>
@@ -419,7 +419,7 @@
           <a:p>
             <a:fld id="{696B610F-1BCF-4E6C-A467-DBFDBF323FD6}" type="datetimeFigureOut">
               <a:rPr lang="en-US" smtClean="0"/>
-              <a:t>11/25/2016</a:t>
+              <a:t>11/26/2016</a:t>
             </a:fld>
             <a:endParaRPr lang="en-US"/>
           </a:p>
@@ -599,7 +599,7 @@
           <a:p>
             <a:fld id="{696B610F-1BCF-4E6C-A467-DBFDBF323FD6}" type="datetimeFigureOut">
               <a:rPr lang="en-US" smtClean="0"/>
-              <a:t>11/25/2016</a:t>
+              <a:t>11/26/2016</a:t>
             </a:fld>
             <a:endParaRPr lang="en-US"/>
           </a:p>
@@ -769,7 +769,7 @@
           <a:p>
             <a:fld id="{696B610F-1BCF-4E6C-A467-DBFDBF323FD6}" type="datetimeFigureOut">
               <a:rPr lang="en-US" smtClean="0"/>
-              <a:t>11/25/2016</a:t>
+              <a:t>11/26/2016</a:t>
             </a:fld>
             <a:endParaRPr lang="en-US"/>
           </a:p>
@@ -1015,7 +1015,7 @@
           <a:p>
             <a:fld id="{696B610F-1BCF-4E6C-A467-DBFDBF323FD6}" type="datetimeFigureOut">
               <a:rPr lang="en-US" smtClean="0"/>
-              <a:t>11/25/2016</a:t>
+              <a:t>11/26/2016</a:t>
             </a:fld>
             <a:endParaRPr lang="en-US"/>
           </a:p>
@@ -1247,7 +1247,7 @@
           <a:p>
             <a:fld id="{696B610F-1BCF-4E6C-A467-DBFDBF323FD6}" type="datetimeFigureOut">
               <a:rPr lang="en-US" smtClean="0"/>
-              <a:t>11/25/2016</a:t>
+              <a:t>11/26/2016</a:t>
             </a:fld>
             <a:endParaRPr lang="en-US"/>
           </a:p>
@@ -1614,7 +1614,7 @@
           <a:p>
             <a:fld id="{696B610F-1BCF-4E6C-A467-DBFDBF323FD6}" type="datetimeFigureOut">
               <a:rPr lang="en-US" smtClean="0"/>
-              <a:t>11/25/2016</a:t>
+              <a:t>11/26/2016</a:t>
             </a:fld>
             <a:endParaRPr lang="en-US"/>
           </a:p>
@@ -1732,7 +1732,7 @@
           <a:p>
             <a:fld id="{696B610F-1BCF-4E6C-A467-DBFDBF323FD6}" type="datetimeFigureOut">
               <a:rPr lang="en-US" smtClean="0"/>
-              <a:t>11/25/2016</a:t>
+              <a:t>11/26/2016</a:t>
             </a:fld>
             <a:endParaRPr lang="en-US"/>
           </a:p>
@@ -1827,7 +1827,7 @@
           <a:p>
             <a:fld id="{696B610F-1BCF-4E6C-A467-DBFDBF323FD6}" type="datetimeFigureOut">
               <a:rPr lang="en-US" smtClean="0"/>
-              <a:t>11/25/2016</a:t>
+              <a:t>11/26/2016</a:t>
             </a:fld>
             <a:endParaRPr lang="en-US"/>
           </a:p>
@@ -2104,7 +2104,7 @@
           <a:p>
             <a:fld id="{696B610F-1BCF-4E6C-A467-DBFDBF323FD6}" type="datetimeFigureOut">
               <a:rPr lang="en-US" smtClean="0"/>
-              <a:t>11/25/2016</a:t>
+              <a:t>11/26/2016</a:t>
             </a:fld>
             <a:endParaRPr lang="en-US"/>
           </a:p>
@@ -2357,7 +2357,7 @@
           <a:p>
             <a:fld id="{696B610F-1BCF-4E6C-A467-DBFDBF323FD6}" type="datetimeFigureOut">
               <a:rPr lang="en-US" smtClean="0"/>
-              <a:t>11/25/2016</a:t>
+              <a:t>11/26/2016</a:t>
             </a:fld>
             <a:endParaRPr lang="en-US"/>
           </a:p>
@@ -2570,7 +2570,7 @@
           <a:p>
             <a:fld id="{696B610F-1BCF-4E6C-A467-DBFDBF323FD6}" type="datetimeFigureOut">
               <a:rPr lang="en-US" smtClean="0"/>
-              <a:t>11/25/2016</a:t>
+              <a:t>11/26/2016</a:t>
             </a:fld>
             <a:endParaRPr lang="en-US"/>
           </a:p>
@@ -4657,6 +4657,13 @@
   <p:clrMapOvr>
     <a:masterClrMapping/>
   </p:clrMapOvr>
+  <p:timing>
+    <p:tnLst>
+      <p:par>
+        <p:cTn id="1" dur="indefinite" restart="never" nodeType="tmRoot"/>
+      </p:par>
+    </p:tnLst>
+  </p:timing>
 </p:sld>
 </file>
 
@@ -5733,6 +5740,13 @@
   <p:clrMapOvr>
     <a:masterClrMapping/>
   </p:clrMapOvr>
+  <p:timing>
+    <p:tnLst>
+      <p:par>
+        <p:cTn id="1" dur="indefinite" restart="never" nodeType="tmRoot"/>
+      </p:par>
+    </p:tnLst>
+  </p:timing>
 </p:sld>
 </file>
 
@@ -5766,7 +5780,7 @@
         <p:spPr>
           <a:xfrm>
             <a:off x="838200" y="129152"/>
-            <a:ext cx="10515600" cy="608268"/>
+            <a:ext cx="10990006" cy="608268"/>
           </a:xfrm>
         </p:spPr>
         <p:txBody>
@@ -5781,7 +5795,11 @@
             </a:r>
             <a:r>
               <a:rPr lang="en-US" dirty="0" smtClean="0"/>
-              <a:t> Branch</a:t>
+              <a:t> </a:t>
+            </a:r>
+            <a:r>
+              <a:rPr lang="en-US" dirty="0" smtClean="0"/>
+              <a:t>Branch (has all working edits)</a:t>
             </a:r>
             <a:endParaRPr lang="en-US" dirty="0"/>
           </a:p>
@@ -5886,6 +5904,13 @@
   <p:clrMapOvr>
     <a:masterClrMapping/>
   </p:clrMapOvr>
+  <p:timing>
+    <p:tnLst>
+      <p:par>
+        <p:cTn id="1" dur="indefinite" restart="never" nodeType="tmRoot"/>
+      </p:par>
+    </p:tnLst>
+  </p:timing>
 </p:sld>
 </file>
 
@@ -5929,16 +5954,19 @@
           <a:lstStyle/>
           <a:p>
             <a:r>
-              <a:rPr lang="en-US" dirty="0" err="1" smtClean="0"/>
-              <a:t>contentAsMarkdown</a:t>
-            </a:r>
-            <a:r>
               <a:rPr lang="en-US" dirty="0" smtClean="0"/>
-              <a:t> </a:t>
+              <a:t>master</a:t>
             </a:r>
             <a:r>
               <a:rPr lang="en-US" dirty="0" smtClean="0"/>
-              <a:t>Branch</a:t>
+              <a:t> Branch </a:t>
+            </a:r>
+            <a:br>
+              <a:rPr lang="en-US" dirty="0" smtClean="0"/>
+            </a:br>
+            <a:r>
+              <a:rPr lang="en-US" dirty="0" smtClean="0"/>
+              <a:t>(content as it was before edits in new branch)</a:t>
             </a:r>
             <a:endParaRPr lang="en-US" dirty="0"/>
           </a:p>
@@ -5956,8 +5984,8 @@
         </p:nvSpPr>
         <p:spPr>
           <a:xfrm>
-            <a:off x="838200" y="2135333"/>
-            <a:ext cx="10515600" cy="4351338"/>
+            <a:off x="838200" y="2268068"/>
+            <a:ext cx="10515600" cy="4589931"/>
           </a:xfrm>
         </p:spPr>
         <p:txBody>
@@ -6009,23 +6037,15 @@
             </a:r>
             <a:r>
               <a:rPr lang="en-US" dirty="0" smtClean="0"/>
-              <a:t>to switch back to </a:t>
+              <a:t>to switch back to working </a:t>
             </a:r>
             <a:r>
               <a:rPr lang="en-US" dirty="0" smtClean="0"/>
-              <a:t>working </a:t>
+              <a:t>branch (with all new edits) </a:t>
             </a:r>
             <a:r>
               <a:rPr lang="en-US" dirty="0" smtClean="0"/>
-              <a:t>branch </a:t>
-            </a:r>
-            <a:r>
-              <a:rPr lang="en-US" dirty="0" smtClean="0"/>
-              <a:t>… This </a:t>
-            </a:r>
-            <a:r>
-              <a:rPr lang="en-US" dirty="0" smtClean="0"/>
-              <a:t>is just a test to illustrate the two branches</a:t>
+              <a:t>… This is just a test to illustrate the two branches</a:t>
             </a:r>
             <a:endParaRPr lang="en-US" dirty="0"/>
           </a:p>
@@ -6047,7 +6067,7 @@
         </p:blipFill>
         <p:spPr>
           <a:xfrm>
-            <a:off x="838200" y="865699"/>
+            <a:off x="897192" y="1042675"/>
             <a:ext cx="7534275" cy="4448175"/>
           </a:xfrm>
           <a:prstGeom prst="rect">
@@ -6065,6 +6085,13 @@
   <p:clrMapOvr>
     <a:masterClrMapping/>
   </p:clrMapOvr>
+  <p:timing>
+    <p:tnLst>
+      <p:par>
+        <p:cTn id="1" dur="indefinite" restart="never" nodeType="tmRoot"/>
+      </p:par>
+    </p:tnLst>
+  </p:timing>
 </p:sld>
 </file>
 

</xml_diff>

<commit_message>
updates to .sh files, ppt branching lesson 3, and Thumbs.db
</commit_message>
<xml_diff>
--- a/GitHub_win7/Git Branching Example - Lesson3.pptx
+++ b/GitHub_win7/Git Branching Example - Lesson3.pptx
@@ -6029,9 +6029,21 @@
           <a:p>
             <a:r>
               <a:rPr lang="en-US" dirty="0"/>
-              <a:t># Git-Update-Online-Repo.sh</a:t>
-            </a:r>
-            <a:endParaRPr lang="en-US" dirty="0" smtClean="0"/>
+              <a:t># </a:t>
+            </a:r>
+            <a:r>
+              <a:rPr lang="en-US" b="1" dirty="0">
+                <a:solidFill>
+                  <a:srgbClr val="0070C0"/>
+                </a:solidFill>
+              </a:rPr>
+              <a:t>Git-Update-Online-Repo.sh</a:t>
+            </a:r>
+            <a:endParaRPr lang="en-US" b="1" dirty="0" smtClean="0">
+              <a:solidFill>
+                <a:srgbClr val="0070C0"/>
+              </a:solidFill>
+            </a:endParaRPr>
           </a:p>
           <a:p>
             <a:r>
@@ -6134,7 +6146,15 @@
           <a:p>
             <a:r>
               <a:rPr lang="en-US" dirty="0"/>
-              <a:t># Git-Commit-Local-Repo.sh</a:t>
+              <a:t># </a:t>
+            </a:r>
+            <a:r>
+              <a:rPr lang="en-US" b="1" dirty="0">
+                <a:solidFill>
+                  <a:srgbClr val="0070C0"/>
+                </a:solidFill>
+              </a:rPr>
+              <a:t>Git-Commit-Local-Repo.sh</a:t>
             </a:r>
           </a:p>
           <a:p>

</xml_diff>